<commit_message>
render final regular expression
</commit_message>
<xml_diff>
--- a/latex/popl2026/flow.pptx
+++ b/latex/popl2026/flow.pptx
@@ -197,7 +197,7 @@
           <a:p>
             <a:fld id="{0709DEA7-5E0E-B342-9CE4-FCF21B1958E0}" type="datetimeFigureOut">
               <a:rPr lang="en-US" smtClean="0"/>
-              <a:t>5/26/25</a:t>
+              <a:t>5/27/25</a:t>
             </a:fld>
             <a:endParaRPr lang="en-US"/>
           </a:p>
@@ -684,7 +684,7 @@
           <a:p>
             <a:fld id="{FAC548D3-0433-7442-8CA6-6A33DD5FB3B5}" type="datetimeFigureOut">
               <a:rPr lang="en-US" smtClean="0"/>
-              <a:t>5/26/25</a:t>
+              <a:t>5/27/25</a:t>
             </a:fld>
             <a:endParaRPr lang="en-US"/>
           </a:p>
@@ -854,7 +854,7 @@
           <a:p>
             <a:fld id="{FAC548D3-0433-7442-8CA6-6A33DD5FB3B5}" type="datetimeFigureOut">
               <a:rPr lang="en-US" smtClean="0"/>
-              <a:t>5/26/25</a:t>
+              <a:t>5/27/25</a:t>
             </a:fld>
             <a:endParaRPr lang="en-US"/>
           </a:p>
@@ -1034,7 +1034,7 @@
           <a:p>
             <a:fld id="{FAC548D3-0433-7442-8CA6-6A33DD5FB3B5}" type="datetimeFigureOut">
               <a:rPr lang="en-US" smtClean="0"/>
-              <a:t>5/26/25</a:t>
+              <a:t>5/27/25</a:t>
             </a:fld>
             <a:endParaRPr lang="en-US"/>
           </a:p>
@@ -1204,7 +1204,7 @@
           <a:p>
             <a:fld id="{FAC548D3-0433-7442-8CA6-6A33DD5FB3B5}" type="datetimeFigureOut">
               <a:rPr lang="en-US" smtClean="0"/>
-              <a:t>5/26/25</a:t>
+              <a:t>5/27/25</a:t>
             </a:fld>
             <a:endParaRPr lang="en-US"/>
           </a:p>
@@ -1450,7 +1450,7 @@
           <a:p>
             <a:fld id="{FAC548D3-0433-7442-8CA6-6A33DD5FB3B5}" type="datetimeFigureOut">
               <a:rPr lang="en-US" smtClean="0"/>
-              <a:t>5/26/25</a:t>
+              <a:t>5/27/25</a:t>
             </a:fld>
             <a:endParaRPr lang="en-US"/>
           </a:p>
@@ -1682,7 +1682,7 @@
           <a:p>
             <a:fld id="{FAC548D3-0433-7442-8CA6-6A33DD5FB3B5}" type="datetimeFigureOut">
               <a:rPr lang="en-US" smtClean="0"/>
-              <a:t>5/26/25</a:t>
+              <a:t>5/27/25</a:t>
             </a:fld>
             <a:endParaRPr lang="en-US"/>
           </a:p>
@@ -2049,7 +2049,7 @@
           <a:p>
             <a:fld id="{FAC548D3-0433-7442-8CA6-6A33DD5FB3B5}" type="datetimeFigureOut">
               <a:rPr lang="en-US" smtClean="0"/>
-              <a:t>5/26/25</a:t>
+              <a:t>5/27/25</a:t>
             </a:fld>
             <a:endParaRPr lang="en-US"/>
           </a:p>
@@ -2167,7 +2167,7 @@
           <a:p>
             <a:fld id="{FAC548D3-0433-7442-8CA6-6A33DD5FB3B5}" type="datetimeFigureOut">
               <a:rPr lang="en-US" smtClean="0"/>
-              <a:t>5/26/25</a:t>
+              <a:t>5/27/25</a:t>
             </a:fld>
             <a:endParaRPr lang="en-US"/>
           </a:p>
@@ -2262,7 +2262,7 @@
           <a:p>
             <a:fld id="{FAC548D3-0433-7442-8CA6-6A33DD5FB3B5}" type="datetimeFigureOut">
               <a:rPr lang="en-US" smtClean="0"/>
-              <a:t>5/26/25</a:t>
+              <a:t>5/27/25</a:t>
             </a:fld>
             <a:endParaRPr lang="en-US"/>
           </a:p>
@@ -2539,7 +2539,7 @@
           <a:p>
             <a:fld id="{FAC548D3-0433-7442-8CA6-6A33DD5FB3B5}" type="datetimeFigureOut">
               <a:rPr lang="en-US" smtClean="0"/>
-              <a:t>5/26/25</a:t>
+              <a:t>5/27/25</a:t>
             </a:fld>
             <a:endParaRPr lang="en-US"/>
           </a:p>
@@ -2803,7 +2803,7 @@
           <a:p>
             <a:fld id="{FAC548D3-0433-7442-8CA6-6A33DD5FB3B5}" type="datetimeFigureOut">
               <a:rPr lang="en-US" smtClean="0"/>
-              <a:t>5/26/25</a:t>
+              <a:t>5/27/25</a:t>
             </a:fld>
             <a:endParaRPr lang="en-US"/>
           </a:p>
@@ -3019,7 +3019,7 @@
           <a:p>
             <a:fld id="{FAC548D3-0433-7442-8CA6-6A33DD5FB3B5}" type="datetimeFigureOut">
               <a:rPr lang="en-US" smtClean="0"/>
-              <a:t>5/26/25</a:t>
+              <a:t>5/27/25</a:t>
             </a:fld>
             <a:endParaRPr lang="en-US"/>
           </a:p>
@@ -6019,6 +6019,36 @@
           </a:p>
         </p:txBody>
       </p:sp>
+      <p:pic>
+        <p:nvPicPr>
+          <p:cNvPr id="8" name="Picture 7">
+            <a:extLst>
+              <a:ext uri="{FF2B5EF4-FFF2-40B4-BE49-F238E27FC236}">
+                <a16:creationId xmlns:a16="http://schemas.microsoft.com/office/drawing/2014/main" id="{571BA966-49AC-D9C6-4ED4-66E1328D5E54}"/>
+              </a:ext>
+            </a:extLst>
+          </p:cNvPr>
+          <p:cNvPicPr>
+            <a:picLocks noChangeAspect="1"/>
+          </p:cNvPicPr>
+          <p:nvPr/>
+        </p:nvPicPr>
+        <p:blipFill>
+          <a:blip r:embed="rId7"/>
+          <a:stretch>
+            <a:fillRect/>
+          </a:stretch>
+        </p:blipFill>
+        <p:spPr>
+          <a:xfrm>
+            <a:off x="21379383" y="2118370"/>
+            <a:ext cx="4980232" cy="3685992"/>
+          </a:xfrm>
+          <a:prstGeom prst="rect">
+            <a:avLst/>
+          </a:prstGeom>
+        </p:spPr>
+      </p:pic>
     </p:spTree>
     <p:extLst>
       <p:ext uri="{BB962C8B-B14F-4D97-AF65-F5344CB8AC3E}">

</xml_diff>